<commit_message>
updated pics & slide master layout
</commit_message>
<xml_diff>
--- a/TestProject2/test_ppt2_template.pptx
+++ b/TestProject2/test_ppt2_template.pptx
@@ -114,6 +114,102 @@
 
 <file path=ppt/changesInfos/changesInfo1.xml><?xml version="1.0" encoding="utf-8"?>
 <pc:chgInfo xmlns:a="http://schemas.openxmlformats.org/drawingml/2006/main" xmlns:r="http://schemas.openxmlformats.org/officeDocument/2006/relationships" xmlns:ac="http://schemas.microsoft.com/office/drawing/2013/main/command" xmlns:pc="http://schemas.microsoft.com/office/powerpoint/2013/main/command">
+  <pc:docChgLst>
+    <pc:chgData name="Patricia Rollins" userId="b46a4d9d1d1643a6" providerId="LiveId" clId="{6D1BD3E3-F7FD-4A1D-9746-A24F674474E0}"/>
+    <pc:docChg chg="custSel modMainMaster">
+      <pc:chgData name="Patricia Rollins" userId="b46a4d9d1d1643a6" providerId="LiveId" clId="{6D1BD3E3-F7FD-4A1D-9746-A24F674474E0}" dt="2023-04-20T03:58:59.828" v="20" actId="14100"/>
+      <pc:docMkLst>
+        <pc:docMk/>
+      </pc:docMkLst>
+      <pc:sldMasterChg chg="modSldLayout">
+        <pc:chgData name="Patricia Rollins" userId="b46a4d9d1d1643a6" providerId="LiveId" clId="{6D1BD3E3-F7FD-4A1D-9746-A24F674474E0}" dt="2023-04-20T03:58:59.828" v="20" actId="14100"/>
+        <pc:sldMasterMkLst>
+          <pc:docMk/>
+          <pc:sldMasterMk cId="0" sldId="2147483648"/>
+        </pc:sldMasterMkLst>
+        <pc:sldLayoutChg chg="addSp delSp modSp mod">
+          <pc:chgData name="Patricia Rollins" userId="b46a4d9d1d1643a6" providerId="LiveId" clId="{6D1BD3E3-F7FD-4A1D-9746-A24F674474E0}" dt="2023-04-20T03:58:59.828" v="20" actId="14100"/>
+          <pc:sldLayoutMkLst>
+            <pc:docMk/>
+            <pc:sldMasterMk cId="0" sldId="2147483648"/>
+            <pc:sldLayoutMk cId="1572020028" sldId="2147483654"/>
+          </pc:sldLayoutMkLst>
+          <pc:spChg chg="add del">
+            <ac:chgData name="Patricia Rollins" userId="b46a4d9d1d1643a6" providerId="LiveId" clId="{6D1BD3E3-F7FD-4A1D-9746-A24F674474E0}" dt="2023-04-20T03:46:58.658" v="1" actId="11529"/>
+            <ac:spMkLst>
+              <pc:docMk/>
+              <pc:sldMasterMk cId="0" sldId="2147483648"/>
+              <pc:sldLayoutMk cId="1572020028" sldId="2147483654"/>
+              <ac:spMk id="3" creationId="{8705FB42-EACA-EDB0-CE22-FE14524F42F1}"/>
+            </ac:spMkLst>
+          </pc:spChg>
+          <pc:spChg chg="add del mod">
+            <ac:chgData name="Patricia Rollins" userId="b46a4d9d1d1643a6" providerId="LiveId" clId="{6D1BD3E3-F7FD-4A1D-9746-A24F674474E0}" dt="2023-04-20T03:48:14.922" v="4" actId="478"/>
+            <ac:spMkLst>
+              <pc:docMk/>
+              <pc:sldMasterMk cId="0" sldId="2147483648"/>
+              <pc:sldLayoutMk cId="1572020028" sldId="2147483654"/>
+              <ac:spMk id="4" creationId="{2335AED3-0841-9740-9AB6-67479965468B}"/>
+            </ac:spMkLst>
+          </pc:spChg>
+          <pc:spChg chg="add mod">
+            <ac:chgData name="Patricia Rollins" userId="b46a4d9d1d1643a6" providerId="LiveId" clId="{6D1BD3E3-F7FD-4A1D-9746-A24F674474E0}" dt="2023-04-20T03:57:32.081" v="11" actId="14100"/>
+            <ac:spMkLst>
+              <pc:docMk/>
+              <pc:sldMasterMk cId="0" sldId="2147483648"/>
+              <pc:sldLayoutMk cId="1572020028" sldId="2147483654"/>
+              <ac:spMk id="6" creationId="{B79475C4-3B3F-3855-AA82-A9C68EB18A84}"/>
+            </ac:spMkLst>
+          </pc:spChg>
+          <pc:spChg chg="del">
+            <ac:chgData name="Patricia Rollins" userId="b46a4d9d1d1643a6" providerId="LiveId" clId="{6D1BD3E3-F7FD-4A1D-9746-A24F674474E0}" dt="2023-04-20T03:46:28.617" v="0" actId="478"/>
+            <ac:spMkLst>
+              <pc:docMk/>
+              <pc:sldMasterMk cId="0" sldId="2147483648"/>
+              <pc:sldLayoutMk cId="1572020028" sldId="2147483654"/>
+              <ac:spMk id="10" creationId="{E0D77E2F-B659-F9B1-6505-24409500C121}"/>
+            </ac:spMkLst>
+          </pc:spChg>
+          <pc:spChg chg="mod">
+            <ac:chgData name="Patricia Rollins" userId="b46a4d9d1d1643a6" providerId="LiveId" clId="{6D1BD3E3-F7FD-4A1D-9746-A24F674474E0}" dt="2023-04-20T03:58:42.473" v="17" actId="14100"/>
+            <ac:spMkLst>
+              <pc:docMk/>
+              <pc:sldMasterMk cId="0" sldId="2147483648"/>
+              <pc:sldLayoutMk cId="1572020028" sldId="2147483654"/>
+              <ac:spMk id="11" creationId="{481BFF7B-AFC7-C7B4-619D-B18AD355FE1F}"/>
+            </ac:spMkLst>
+          </pc:spChg>
+          <pc:spChg chg="mod">
+            <ac:chgData name="Patricia Rollins" userId="b46a4d9d1d1643a6" providerId="LiveId" clId="{6D1BD3E3-F7FD-4A1D-9746-A24F674474E0}" dt="2023-04-20T03:58:38.465" v="16" actId="14100"/>
+            <ac:spMkLst>
+              <pc:docMk/>
+              <pc:sldMasterMk cId="0" sldId="2147483648"/>
+              <pc:sldLayoutMk cId="1572020028" sldId="2147483654"/>
+              <ac:spMk id="12" creationId="{1990B8D2-668D-691D-C684-78A86AC6F62B}"/>
+            </ac:spMkLst>
+          </pc:spChg>
+          <pc:spChg chg="mod">
+            <ac:chgData name="Patricia Rollins" userId="b46a4d9d1d1643a6" providerId="LiveId" clId="{6D1BD3E3-F7FD-4A1D-9746-A24F674474E0}" dt="2023-04-20T03:58:59.828" v="20" actId="14100"/>
+            <ac:spMkLst>
+              <pc:docMk/>
+              <pc:sldMasterMk cId="0" sldId="2147483648"/>
+              <pc:sldLayoutMk cId="1572020028" sldId="2147483654"/>
+              <ac:spMk id="13" creationId="{80D55D48-4F25-3D1D-795C-9F55F6CC03F2}"/>
+            </ac:spMkLst>
+          </pc:spChg>
+          <pc:spChg chg="mod">
+            <ac:chgData name="Patricia Rollins" userId="b46a4d9d1d1643a6" providerId="LiveId" clId="{6D1BD3E3-F7FD-4A1D-9746-A24F674474E0}" dt="2023-04-20T03:58:51.233" v="19" actId="14100"/>
+            <ac:spMkLst>
+              <pc:docMk/>
+              <pc:sldMasterMk cId="0" sldId="2147483648"/>
+              <pc:sldLayoutMk cId="1572020028" sldId="2147483654"/>
+              <ac:spMk id="16" creationId="{3455320D-0E57-61D2-AED7-C2EB3B0E6E23}"/>
+            </ac:spMkLst>
+          </pc:spChg>
+        </pc:sldLayoutChg>
+      </pc:sldMasterChg>
+    </pc:docChg>
+  </pc:docChgLst>
   <pc:docChgLst>
     <pc:chgData name="Patricia Rollins" userId="b46a4d9d1d1643a6" providerId="LiveId" clId="{304B983D-776B-4B3F-9F54-508CDD852E03}"/>
     <pc:docChg chg="undo custSel addSld delSld modSld modMainMaster">
@@ -933,7 +1029,7 @@
             <a:fld id="{B61BEF0D-F0BB-DE4B-95CE-6DB70DBA9567}" type="datetimeFigureOut">
               <a:rPr lang="en-US" dirty="0"/>
               <a:pPr/>
-              <a:t>4/18/2023</a:t>
+              <a:t>4/19/2023</a:t>
             </a:fld>
             <a:endParaRPr lang="en-US" dirty="0"/>
           </a:p>
@@ -1770,8 +1866,8 @@
         </p:nvSpPr>
         <p:spPr>
           <a:xfrm>
-            <a:off x="685799" y="2503503"/>
-            <a:ext cx="3921712" cy="2975237"/>
+            <a:off x="685798" y="2086252"/>
+            <a:ext cx="4267941" cy="3392489"/>
           </a:xfrm>
         </p:spPr>
         <p:txBody>
@@ -1800,8 +1896,8 @@
         </p:nvSpPr>
         <p:spPr>
           <a:xfrm>
-            <a:off x="7565993" y="2503504"/>
-            <a:ext cx="3921712" cy="2993216"/>
+            <a:off x="7315201" y="2104009"/>
+            <a:ext cx="4172504" cy="3392711"/>
           </a:xfrm>
         </p:spPr>
         <p:txBody>
@@ -1830,8 +1926,8 @@
         </p:nvSpPr>
         <p:spPr>
           <a:xfrm>
-            <a:off x="7565407" y="1484279"/>
-            <a:ext cx="3921125" cy="832298"/>
+            <a:off x="7314029" y="1484279"/>
+            <a:ext cx="4172503" cy="476824"/>
           </a:xfrm>
         </p:spPr>
         <p:txBody>
@@ -1893,7 +1989,7 @@
         <p:spPr>
           <a:xfrm>
             <a:off x="678504" y="1487979"/>
-            <a:ext cx="3921125" cy="832298"/>
+            <a:ext cx="4275235" cy="476824"/>
           </a:xfrm>
         </p:spPr>
         <p:txBody>
@@ -1938,30 +2034,46 @@
       </p:sp>
       <p:sp>
         <p:nvSpPr>
-          <p:cNvPr id="10" name="SmartArt Placeholder 9">
+          <p:cNvPr id="6" name="Arrow: Right 5">
             <a:extLst>
               <a:ext uri="{FF2B5EF4-FFF2-40B4-BE49-F238E27FC236}">
-                <a16:creationId xmlns:a16="http://schemas.microsoft.com/office/drawing/2014/main" id="{E0D77E2F-B659-F9B1-6505-24409500C121}"/>
+                <a16:creationId xmlns:a16="http://schemas.microsoft.com/office/drawing/2014/main" id="{B79475C4-3B3F-3855-AA82-A9C68EB18A84}"/>
               </a:ext>
             </a:extLst>
           </p:cNvPr>
-          <p:cNvSpPr>
-            <a:spLocks noGrp="1"/>
-          </p:cNvSpPr>
-          <p:nvPr>
-            <p:ph type="dgm" sz="quarter" idx="19"/>
-          </p:nvPr>
+          <p:cNvSpPr/>
+          <p:nvPr userDrawn="1"/>
         </p:nvSpPr>
         <p:spPr>
           <a:xfrm>
-            <a:off x="4829175" y="2867025"/>
-            <a:ext cx="2520950" cy="1687513"/>
+            <a:off x="5113538" y="3240350"/>
+            <a:ext cx="2041864" cy="1052802"/>
           </a:xfrm>
+          <a:prstGeom prst="rightArrow">
+            <a:avLst/>
+          </a:prstGeom>
         </p:spPr>
-        <p:txBody>
-          <a:bodyPr/>
+        <p:style>
+          <a:lnRef idx="2">
+            <a:schemeClr val="accent1">
+              <a:shade val="50000"/>
+            </a:schemeClr>
+          </a:lnRef>
+          <a:fillRef idx="1">
+            <a:schemeClr val="accent1"/>
+          </a:fillRef>
+          <a:effectRef idx="0">
+            <a:schemeClr val="accent1"/>
+          </a:effectRef>
+          <a:fontRef idx="minor">
+            <a:schemeClr val="lt1"/>
+          </a:fontRef>
+        </p:style>
+        <p:txBody>
+          <a:bodyPr rtlCol="0" anchor="ctr"/>
           <a:lstStyle/>
           <a:p>
+            <a:pPr algn="ctr"/>
             <a:endParaRPr lang="en-US"/>
           </a:p>
         </p:txBody>
@@ -2133,7 +2245,7 @@
             <a:fld id="{B61BEF0D-F0BB-DE4B-95CE-6DB70DBA9567}" type="datetimeFigureOut">
               <a:rPr lang="en-US" dirty="0"/>
               <a:pPr/>
-              <a:t>4/18/2023</a:t>
+              <a:t>4/19/2023</a:t>
             </a:fld>
             <a:endParaRPr lang="en-US" dirty="0"/>
           </a:p>

</xml_diff>

<commit_message>
added code to change images
</commit_message>
<xml_diff>
--- a/TestProject2/test_ppt2_template.pptx
+++ b/TestProject2/test_ppt2_template.pptx
@@ -112,8 +112,156 @@
 </p:presentation>
 </file>
 
+<file path=ppt/revisionInfo.xml><?xml version="1.0" encoding="utf-8"?>
+<p1510:revInfo xmlns:a="http://schemas.openxmlformats.org/drawingml/2006/main" xmlns:r="http://schemas.openxmlformats.org/officeDocument/2006/relationships" xmlns:p1510="http://schemas.microsoft.com/office/powerpoint/2015/10/main">
+  <p1510:revLst>
+    <p1510:client id="{CCAA120E-3857-48F0-8045-4D5E5F803748}" v="80" dt="2023-04-20T19:22:48.190"/>
+  </p1510:revLst>
+</p1510:revInfo>
+</file>
+
 <file path=ppt/changesInfos/changesInfo1.xml><?xml version="1.0" encoding="utf-8"?>
 <pc:chgInfo xmlns:a="http://schemas.openxmlformats.org/drawingml/2006/main" xmlns:r="http://schemas.openxmlformats.org/officeDocument/2006/relationships" xmlns:ac="http://schemas.microsoft.com/office/drawing/2013/main/command" xmlns:pc="http://schemas.microsoft.com/office/powerpoint/2013/main/command">
+  <pc:docChgLst>
+    <pc:chgData name="Rollins, Patricia" userId="43f671f9-f74c-4b8a-bdf3-ae1863f543dd" providerId="ADAL" clId="{CCAA120E-3857-48F0-8045-4D5E5F803748}"/>
+    <pc:docChg chg="modMainMaster">
+      <pc:chgData name="Rollins, Patricia" userId="43f671f9-f74c-4b8a-bdf3-ae1863f543dd" providerId="ADAL" clId="{CCAA120E-3857-48F0-8045-4D5E5F803748}" dt="2023-04-20T19:24:34.665" v="136" actId="14100"/>
+      <pc:docMkLst>
+        <pc:docMk/>
+      </pc:docMkLst>
+      <pc:sldMasterChg chg="modSldLayout">
+        <pc:chgData name="Rollins, Patricia" userId="43f671f9-f74c-4b8a-bdf3-ae1863f543dd" providerId="ADAL" clId="{CCAA120E-3857-48F0-8045-4D5E5F803748}" dt="2023-04-20T19:24:34.665" v="136" actId="14100"/>
+        <pc:sldMasterMkLst>
+          <pc:docMk/>
+          <pc:sldMasterMk cId="0" sldId="2147483648"/>
+        </pc:sldMasterMkLst>
+        <pc:sldLayoutChg chg="modSp mod">
+          <pc:chgData name="Rollins, Patricia" userId="43f671f9-f74c-4b8a-bdf3-ae1863f543dd" providerId="ADAL" clId="{CCAA120E-3857-48F0-8045-4D5E5F803748}" dt="2023-04-20T19:24:34.665" v="136" actId="14100"/>
+          <pc:sldLayoutMkLst>
+            <pc:docMk/>
+            <pc:sldMasterMk cId="0" sldId="2147483648"/>
+            <pc:sldLayoutMk cId="0" sldId="2147483653"/>
+          </pc:sldLayoutMkLst>
+          <pc:spChg chg="mod">
+            <ac:chgData name="Rollins, Patricia" userId="43f671f9-f74c-4b8a-bdf3-ae1863f543dd" providerId="ADAL" clId="{CCAA120E-3857-48F0-8045-4D5E5F803748}" dt="2023-04-20T19:24:34.665" v="136" actId="14100"/>
+            <ac:spMkLst>
+              <pc:docMk/>
+              <pc:sldMasterMk cId="0" sldId="2147483648"/>
+              <pc:sldLayoutMk cId="0" sldId="2147483653"/>
+              <ac:spMk id="3" creationId="{00000000-0000-0000-0000-000000000000}"/>
+            </ac:spMkLst>
+          </pc:spChg>
+          <pc:spChg chg="mod">
+            <ac:chgData name="Rollins, Patricia" userId="43f671f9-f74c-4b8a-bdf3-ae1863f543dd" providerId="ADAL" clId="{CCAA120E-3857-48F0-8045-4D5E5F803748}" dt="2023-04-20T19:24:23.575" v="135" actId="14100"/>
+            <ac:spMkLst>
+              <pc:docMk/>
+              <pc:sldMasterMk cId="0" sldId="2147483648"/>
+              <pc:sldLayoutMk cId="0" sldId="2147483653"/>
+              <ac:spMk id="5" creationId="{00000000-0000-0000-0000-000000000000}"/>
+            </ac:spMkLst>
+          </pc:spChg>
+          <pc:spChg chg="mod">
+            <ac:chgData name="Rollins, Patricia" userId="43f671f9-f74c-4b8a-bdf3-ae1863f543dd" providerId="ADAL" clId="{CCAA120E-3857-48F0-8045-4D5E5F803748}" dt="2023-04-20T19:23:38.596" v="128" actId="14100"/>
+            <ac:spMkLst>
+              <pc:docMk/>
+              <pc:sldMasterMk cId="0" sldId="2147483648"/>
+              <pc:sldLayoutMk cId="0" sldId="2147483653"/>
+              <ac:spMk id="13" creationId="{80D55D48-4F25-3D1D-795C-9F55F6CC03F2}"/>
+            </ac:spMkLst>
+          </pc:spChg>
+          <pc:spChg chg="mod">
+            <ac:chgData name="Rollins, Patricia" userId="43f671f9-f74c-4b8a-bdf3-ae1863f543dd" providerId="ADAL" clId="{CCAA120E-3857-48F0-8045-4D5E5F803748}" dt="2023-04-20T19:24:00.010" v="131" actId="14100"/>
+            <ac:spMkLst>
+              <pc:docMk/>
+              <pc:sldMasterMk cId="0" sldId="2147483648"/>
+              <pc:sldLayoutMk cId="0" sldId="2147483653"/>
+              <ac:spMk id="15" creationId="{161892BB-67F2-63E1-2304-E0B512667D19}"/>
+            </ac:spMkLst>
+          </pc:spChg>
+          <pc:spChg chg="mod">
+            <ac:chgData name="Rollins, Patricia" userId="43f671f9-f74c-4b8a-bdf3-ae1863f543dd" providerId="ADAL" clId="{CCAA120E-3857-48F0-8045-4D5E5F803748}" dt="2023-04-20T19:23:34.261" v="127" actId="14100"/>
+            <ac:spMkLst>
+              <pc:docMk/>
+              <pc:sldMasterMk cId="0" sldId="2147483648"/>
+              <pc:sldLayoutMk cId="0" sldId="2147483653"/>
+              <ac:spMk id="16" creationId="{3455320D-0E57-61D2-AED7-C2EB3B0E6E23}"/>
+            </ac:spMkLst>
+          </pc:spChg>
+          <pc:spChg chg="mod">
+            <ac:chgData name="Rollins, Patricia" userId="43f671f9-f74c-4b8a-bdf3-ae1863f543dd" providerId="ADAL" clId="{CCAA120E-3857-48F0-8045-4D5E5F803748}" dt="2023-04-20T19:24:03.927" v="132" actId="14100"/>
+            <ac:spMkLst>
+              <pc:docMk/>
+              <pc:sldMasterMk cId="0" sldId="2147483648"/>
+              <pc:sldLayoutMk cId="0" sldId="2147483653"/>
+              <ac:spMk id="17" creationId="{2FC33284-B0FC-C228-D736-D8C907D6BE27}"/>
+            </ac:spMkLst>
+          </pc:spChg>
+        </pc:sldLayoutChg>
+        <pc:sldLayoutChg chg="modSp mod">
+          <pc:chgData name="Rollins, Patricia" userId="43f671f9-f74c-4b8a-bdf3-ae1863f543dd" providerId="ADAL" clId="{CCAA120E-3857-48F0-8045-4D5E5F803748}" dt="2023-04-20T15:36:12.257" v="119" actId="113"/>
+          <pc:sldLayoutMkLst>
+            <pc:docMk/>
+            <pc:sldMasterMk cId="0" sldId="2147483648"/>
+            <pc:sldLayoutMk cId="1572020028" sldId="2147483654"/>
+          </pc:sldLayoutMkLst>
+          <pc:spChg chg="mod">
+            <ac:chgData name="Rollins, Patricia" userId="43f671f9-f74c-4b8a-bdf3-ae1863f543dd" providerId="ADAL" clId="{CCAA120E-3857-48F0-8045-4D5E5F803748}" dt="2023-04-20T15:36:12.257" v="119" actId="113"/>
+            <ac:spMkLst>
+              <pc:docMk/>
+              <pc:sldMasterMk cId="0" sldId="2147483648"/>
+              <pc:sldLayoutMk cId="1572020028" sldId="2147483654"/>
+              <ac:spMk id="5" creationId="{00000000-0000-0000-0000-000000000000}"/>
+            </ac:spMkLst>
+          </pc:spChg>
+          <pc:spChg chg="mod">
+            <ac:chgData name="Rollins, Patricia" userId="43f671f9-f74c-4b8a-bdf3-ae1863f543dd" providerId="ADAL" clId="{CCAA120E-3857-48F0-8045-4D5E5F803748}" dt="2023-04-20T14:35:51.069" v="59" actId="208"/>
+            <ac:spMkLst>
+              <pc:docMk/>
+              <pc:sldMasterMk cId="0" sldId="2147483648"/>
+              <pc:sldLayoutMk cId="1572020028" sldId="2147483654"/>
+              <ac:spMk id="6" creationId="{B79475C4-3B3F-3855-AA82-A9C68EB18A84}"/>
+            </ac:spMkLst>
+          </pc:spChg>
+          <pc:spChg chg="mod">
+            <ac:chgData name="Rollins, Patricia" userId="43f671f9-f74c-4b8a-bdf3-ae1863f543dd" providerId="ADAL" clId="{CCAA120E-3857-48F0-8045-4D5E5F803748}" dt="2023-04-20T15:35:15.915" v="111" actId="1076"/>
+            <ac:spMkLst>
+              <pc:docMk/>
+              <pc:sldMasterMk cId="0" sldId="2147483648"/>
+              <pc:sldLayoutMk cId="1572020028" sldId="2147483654"/>
+              <ac:spMk id="11" creationId="{481BFF7B-AFC7-C7B4-619D-B18AD355FE1F}"/>
+            </ac:spMkLst>
+          </pc:spChg>
+          <pc:spChg chg="mod">
+            <ac:chgData name="Rollins, Patricia" userId="43f671f9-f74c-4b8a-bdf3-ae1863f543dd" providerId="ADAL" clId="{CCAA120E-3857-48F0-8045-4D5E5F803748}" dt="2023-04-20T15:34:53.863" v="108" actId="1076"/>
+            <ac:spMkLst>
+              <pc:docMk/>
+              <pc:sldMasterMk cId="0" sldId="2147483648"/>
+              <pc:sldLayoutMk cId="1572020028" sldId="2147483654"/>
+              <ac:spMk id="12" creationId="{1990B8D2-668D-691D-C684-78A86AC6F62B}"/>
+            </ac:spMkLst>
+          </pc:spChg>
+          <pc:spChg chg="mod">
+            <ac:chgData name="Rollins, Patricia" userId="43f671f9-f74c-4b8a-bdf3-ae1863f543dd" providerId="ADAL" clId="{CCAA120E-3857-48F0-8045-4D5E5F803748}" dt="2023-04-20T15:34:49.901" v="107" actId="1076"/>
+            <ac:spMkLst>
+              <pc:docMk/>
+              <pc:sldMasterMk cId="0" sldId="2147483648"/>
+              <pc:sldLayoutMk cId="1572020028" sldId="2147483654"/>
+              <ac:spMk id="13" creationId="{80D55D48-4F25-3D1D-795C-9F55F6CC03F2}"/>
+            </ac:spMkLst>
+          </pc:spChg>
+          <pc:spChg chg="mod">
+            <ac:chgData name="Rollins, Patricia" userId="43f671f9-f74c-4b8a-bdf3-ae1863f543dd" providerId="ADAL" clId="{CCAA120E-3857-48F0-8045-4D5E5F803748}" dt="2023-04-20T15:35:08.287" v="110" actId="1076"/>
+            <ac:spMkLst>
+              <pc:docMk/>
+              <pc:sldMasterMk cId="0" sldId="2147483648"/>
+              <pc:sldLayoutMk cId="1572020028" sldId="2147483654"/>
+              <ac:spMk id="16" creationId="{3455320D-0E57-61D2-AED7-C2EB3B0E6E23}"/>
+            </ac:spMkLst>
+          </pc:spChg>
+        </pc:sldLayoutChg>
+      </pc:sldMasterChg>
+    </pc:docChg>
+  </pc:docChgLst>
   <pc:docChgLst>
     <pc:chgData name="Patricia Rollins" userId="b46a4d9d1d1643a6" providerId="LiveId" clId="{6D1BD3E3-F7FD-4A1D-9746-A24F674474E0}"/>
     <pc:docChg chg="custSel modMainMaster">
@@ -1029,7 +1177,7 @@
             <a:fld id="{B61BEF0D-F0BB-DE4B-95CE-6DB70DBA9567}" type="datetimeFigureOut">
               <a:rPr lang="en-US" dirty="0"/>
               <a:pPr/>
-              <a:t>4/19/2023</a:t>
+              <a:t>4/20/2023</a:t>
             </a:fld>
             <a:endParaRPr lang="en-US" dirty="0"/>
           </a:p>
@@ -1381,8 +1529,8 @@
         </p:nvSpPr>
         <p:spPr>
           <a:xfrm>
-            <a:off x="685799" y="891589"/>
-            <a:ext cx="3948344" cy="346566"/>
+            <a:off x="685800" y="892389"/>
+            <a:ext cx="3309258" cy="345765"/>
           </a:xfrm>
         </p:spPr>
         <p:txBody>
@@ -1392,7 +1540,7 @@
           <a:lstStyle>
             <a:lvl1pPr marL="0" indent="0">
               <a:buNone/>
-              <a:defRPr sz="1600" b="0">
+              <a:defRPr sz="2000" b="0">
                 <a:latin typeface="+mj-lt"/>
               </a:defRPr>
             </a:lvl1pPr>
@@ -1450,8 +1598,8 @@
         </p:nvSpPr>
         <p:spPr>
           <a:xfrm>
-            <a:off x="4756149" y="891589"/>
-            <a:ext cx="6750052" cy="360302"/>
+            <a:off x="4114801" y="891589"/>
+            <a:ext cx="7391398" cy="352394"/>
           </a:xfrm>
         </p:spPr>
         <p:txBody>
@@ -1461,7 +1609,7 @@
           <a:lstStyle>
             <a:lvl1pPr marL="0" indent="0">
               <a:buNone/>
-              <a:defRPr sz="1600" b="0">
+              <a:defRPr sz="2000" b="0">
                 <a:latin typeface="+mj-lt"/>
               </a:defRPr>
             </a:lvl1pPr>
@@ -1574,7 +1722,7 @@
         <p:spPr>
           <a:xfrm>
             <a:off x="685800" y="1342469"/>
-            <a:ext cx="3948113" cy="2086531"/>
+            <a:ext cx="3309257" cy="2086531"/>
           </a:xfrm>
         </p:spPr>
         <p:txBody>
@@ -1603,8 +1751,8 @@
         </p:nvSpPr>
         <p:spPr>
           <a:xfrm>
-            <a:off x="4756149" y="1356206"/>
-            <a:ext cx="6750051" cy="2072794"/>
+            <a:off x="4114801" y="1356206"/>
+            <a:ext cx="7391400" cy="2072794"/>
           </a:xfrm>
         </p:spPr>
         <p:txBody>
@@ -1634,7 +1782,7 @@
         <p:spPr>
           <a:xfrm>
             <a:off x="685800" y="3533314"/>
-            <a:ext cx="3948113" cy="2184862"/>
+            <a:ext cx="3309257" cy="2184862"/>
           </a:xfrm>
         </p:spPr>
         <p:txBody>
@@ -1663,8 +1811,8 @@
         </p:nvSpPr>
         <p:spPr>
           <a:xfrm>
-            <a:off x="4756149" y="3533315"/>
-            <a:ext cx="6750051" cy="2185662"/>
+            <a:off x="4114801" y="3533315"/>
+            <a:ext cx="7391399" cy="2185662"/>
           </a:xfrm>
         </p:spPr>
         <p:txBody>
@@ -1738,23 +1886,28 @@
             <a:spLocks noGrp="1"/>
           </p:cNvSpPr>
           <p:nvPr>
-            <p:ph type="body" sz="quarter" idx="3"/>
+            <p:ph type="body" sz="quarter" idx="3" hasCustomPrompt="1"/>
           </p:nvPr>
         </p:nvSpPr>
         <p:spPr>
           <a:xfrm>
-            <a:off x="685799" y="918389"/>
-            <a:ext cx="6060386" cy="360302"/>
+            <a:off x="704295" y="1061213"/>
+            <a:ext cx="10782238" cy="529424"/>
           </a:xfrm>
+          <a:solidFill>
+            <a:schemeClr val="accent2">
+              <a:lumMod val="75000"/>
+            </a:schemeClr>
+          </a:solidFill>
         </p:spPr>
         <p:txBody>
           <a:bodyPr anchor="b">
             <a:noAutofit/>
           </a:bodyPr>
           <a:lstStyle>
-            <a:lvl1pPr marL="0" indent="0">
-              <a:buNone/>
-              <a:defRPr sz="1600" b="0">
+            <a:lvl1pPr marL="0" indent="0" algn="ctr">
+              <a:buNone/>
+              <a:defRPr sz="2800" b="1">
                 <a:latin typeface="+mj-lt"/>
               </a:defRPr>
             </a:lvl1pPr>
@@ -1795,7 +1948,7 @@
             <a:pPr lvl="0"/>
             <a:r>
               <a:rPr lang="en-US" dirty="0"/>
-              <a:t>Click to edit Master text styles</a:t>
+              <a:t>SAMPLE PROCESS NAME</a:t>
             </a:r>
           </a:p>
         </p:txBody>
@@ -1866,7 +2019,7 @@
         </p:nvSpPr>
         <p:spPr>
           <a:xfrm>
-            <a:off x="685798" y="2086252"/>
+            <a:off x="704295" y="2338658"/>
             <a:ext cx="4267941" cy="3392489"/>
           </a:xfrm>
         </p:spPr>
@@ -1896,7 +2049,7 @@
         </p:nvSpPr>
         <p:spPr>
           <a:xfrm>
-            <a:off x="7315201" y="2104009"/>
+            <a:off x="7314029" y="2338547"/>
             <a:ext cx="4172504" cy="3392711"/>
           </a:xfrm>
         </p:spPr>
@@ -1921,51 +2074,35 @@
             <a:spLocks noGrp="1"/>
           </p:cNvSpPr>
           <p:nvPr>
-            <p:ph type="body" sz="quarter" idx="17"/>
+            <p:ph type="body" sz="quarter" idx="17" hasCustomPrompt="1"/>
           </p:nvPr>
         </p:nvSpPr>
         <p:spPr>
           <a:xfrm>
-            <a:off x="7314029" y="1484279"/>
+            <a:off x="7333699" y="1723770"/>
             <a:ext cx="4172503" cy="476824"/>
           </a:xfrm>
+          <a:solidFill>
+            <a:schemeClr val="accent2">
+              <a:lumMod val="75000"/>
+            </a:schemeClr>
+          </a:solidFill>
         </p:spPr>
         <p:txBody>
-          <a:bodyPr/>
-          <a:lstStyle/>
+          <a:bodyPr>
+            <a:normAutofit/>
+          </a:bodyPr>
+          <a:lstStyle>
+            <a:lvl1pPr marL="0" indent="0" algn="ctr">
+              <a:buNone/>
+              <a:defRPr sz="2400"/>
+            </a:lvl1pPr>
+          </a:lstStyle>
           <a:p>
             <a:pPr lvl="0"/>
             <a:r>
               <a:rPr lang="en-US" dirty="0"/>
-              <a:t>Click to edit Master text styles</a:t>
-            </a:r>
-          </a:p>
-          <a:p>
-            <a:pPr lvl="1"/>
-            <a:r>
-              <a:rPr lang="en-US" dirty="0"/>
-              <a:t>Second level</a:t>
-            </a:r>
-          </a:p>
-          <a:p>
-            <a:pPr lvl="2"/>
-            <a:r>
-              <a:rPr lang="en-US" dirty="0"/>
-              <a:t>Third level</a:t>
-            </a:r>
-          </a:p>
-          <a:p>
-            <a:pPr lvl="3"/>
-            <a:r>
-              <a:rPr lang="en-US" dirty="0"/>
-              <a:t>Fourth level</a:t>
-            </a:r>
-          </a:p>
-          <a:p>
-            <a:pPr lvl="4"/>
-            <a:r>
-              <a:rPr lang="en-US" dirty="0"/>
-              <a:t>Fifth level</a:t>
+              <a:t>SAMPLE PROCESS STEP 2</a:t>
             </a:r>
           </a:p>
         </p:txBody>
@@ -1983,51 +2120,38 @@
             <a:spLocks noGrp="1"/>
           </p:cNvSpPr>
           <p:nvPr>
-            <p:ph type="body" sz="quarter" idx="18"/>
+            <p:ph type="body" sz="quarter" idx="18" hasCustomPrompt="1"/>
           </p:nvPr>
         </p:nvSpPr>
         <p:spPr>
           <a:xfrm>
-            <a:off x="678504" y="1487979"/>
+            <a:off x="685798" y="1722406"/>
             <a:ext cx="4275235" cy="476824"/>
           </a:xfrm>
+          <a:solidFill>
+            <a:schemeClr val="accent2">
+              <a:lumMod val="75000"/>
+            </a:schemeClr>
+          </a:solidFill>
         </p:spPr>
         <p:txBody>
-          <a:bodyPr/>
-          <a:lstStyle/>
+          <a:bodyPr>
+            <a:normAutofit/>
+          </a:bodyPr>
+          <a:lstStyle>
+            <a:lvl1pPr marL="0" indent="0" algn="ctr">
+              <a:buNone/>
+              <a:defRPr sz="2400"/>
+            </a:lvl1pPr>
+            <a:lvl3pPr>
+              <a:defRPr/>
+            </a:lvl3pPr>
+          </a:lstStyle>
           <a:p>
             <a:pPr lvl="0"/>
             <a:r>
               <a:rPr lang="en-US" dirty="0"/>
-              <a:t>Click to edit Master text styles</a:t>
-            </a:r>
-          </a:p>
-          <a:p>
-            <a:pPr lvl="1"/>
-            <a:r>
-              <a:rPr lang="en-US" dirty="0"/>
-              <a:t>Second level</a:t>
-            </a:r>
-          </a:p>
-          <a:p>
-            <a:pPr lvl="2"/>
-            <a:r>
-              <a:rPr lang="en-US" dirty="0"/>
-              <a:t>Third level</a:t>
-            </a:r>
-          </a:p>
-          <a:p>
-            <a:pPr lvl="3"/>
-            <a:r>
-              <a:rPr lang="en-US" dirty="0"/>
-              <a:t>Fourth level</a:t>
-            </a:r>
-          </a:p>
-          <a:p>
-            <a:pPr lvl="4"/>
-            <a:r>
-              <a:rPr lang="en-US" dirty="0"/>
-              <a:t>Fifth level</a:t>
+              <a:t>SAMPLE PROCESS STEP 1</a:t>
             </a:r>
           </a:p>
         </p:txBody>
@@ -2052,6 +2176,19 @@
           <a:prstGeom prst="rightArrow">
             <a:avLst/>
           </a:prstGeom>
+          <a:solidFill>
+            <a:schemeClr val="accent2">
+              <a:lumMod val="75000"/>
+            </a:schemeClr>
+          </a:solidFill>
+          <a:ln>
+            <a:solidFill>
+              <a:schemeClr val="bg2">
+                <a:lumMod val="60000"/>
+                <a:lumOff val="40000"/>
+              </a:schemeClr>
+            </a:solidFill>
+          </a:ln>
         </p:spPr>
         <p:style>
           <a:lnRef idx="2">
@@ -2245,7 +2382,7 @@
             <a:fld id="{B61BEF0D-F0BB-DE4B-95CE-6DB70DBA9567}" type="datetimeFigureOut">
               <a:rPr lang="en-US" dirty="0"/>
               <a:pPr/>
-              <a:t>4/19/2023</a:t>
+              <a:t>4/20/2023</a:t>
             </a:fld>
             <a:endParaRPr lang="en-US" dirty="0"/>
           </a:p>

</xml_diff>